<commit_message>
Added presentation authors and slide numbers
</commit_message>
<xml_diff>
--- a/Documentation/FantasyKnapsack.pptx
+++ b/Documentation/FantasyKnapsack.pptx
@@ -4,6 +4,9 @@
   <p:sldMasterIdLst>
     <p:sldMasterId id="2147483708" r:id="rId1"/>
   </p:sldMasterIdLst>
+  <p:notesMasterIdLst>
+    <p:notesMasterId r:id="rId22"/>
+  </p:notesMasterIdLst>
   <p:sldIdLst>
     <p:sldId id="256" r:id="rId2"/>
     <p:sldId id="257" r:id="rId3"/>
@@ -126,6 +129,353 @@
 </p:presentation>
 </file>
 
+<file path=ppt/notesMasters/notesMaster1.xml><?xml version="1.0" encoding="utf-8"?>
+<p:notesMaster xmlns:a="http://schemas.openxmlformats.org/drawingml/2006/main" xmlns:r="http://schemas.openxmlformats.org/officeDocument/2006/relationships" xmlns:p="http://schemas.openxmlformats.org/presentationml/2006/main">
+  <p:cSld>
+    <p:bg>
+      <p:bgRef idx="1001">
+        <a:schemeClr val="bg1"/>
+      </p:bgRef>
+    </p:bg>
+    <p:spTree>
+      <p:nvGrpSpPr>
+        <p:cNvPr id="1" name=""/>
+        <p:cNvGrpSpPr/>
+        <p:nvPr/>
+      </p:nvGrpSpPr>
+      <p:grpSpPr>
+        <a:xfrm>
+          <a:off x="0" y="0"/>
+          <a:ext cx="0" cy="0"/>
+          <a:chOff x="0" y="0"/>
+          <a:chExt cx="0" cy="0"/>
+        </a:xfrm>
+      </p:grpSpPr>
+      <p:sp>
+        <p:nvSpPr>
+          <p:cNvPr id="2" name="Symbol zastępczy nagłówka 1"/>
+          <p:cNvSpPr>
+            <a:spLocks noGrp="1"/>
+          </p:cNvSpPr>
+          <p:nvPr>
+            <p:ph type="hdr" sz="quarter"/>
+          </p:nvPr>
+        </p:nvSpPr>
+        <p:spPr>
+          <a:xfrm>
+            <a:off x="0" y="0"/>
+            <a:ext cx="2971800" cy="457200"/>
+          </a:xfrm>
+          <a:prstGeom prst="rect">
+            <a:avLst/>
+          </a:prstGeom>
+        </p:spPr>
+        <p:txBody>
+          <a:bodyPr vert="horz" lIns="91440" tIns="45720" rIns="91440" bIns="45720" rtlCol="0"/>
+          <a:lstStyle>
+            <a:lvl1pPr algn="l">
+              <a:defRPr sz="1200"/>
+            </a:lvl1pPr>
+          </a:lstStyle>
+          <a:p>
+            <a:endParaRPr lang="pl-PL"/>
+          </a:p>
+        </p:txBody>
+      </p:sp>
+      <p:sp>
+        <p:nvSpPr>
+          <p:cNvPr id="3" name="Symbol zastępczy daty 2"/>
+          <p:cNvSpPr>
+            <a:spLocks noGrp="1"/>
+          </p:cNvSpPr>
+          <p:nvPr>
+            <p:ph type="dt" idx="1"/>
+          </p:nvPr>
+        </p:nvSpPr>
+        <p:spPr>
+          <a:xfrm>
+            <a:off x="3884613" y="0"/>
+            <a:ext cx="2971800" cy="457200"/>
+          </a:xfrm>
+          <a:prstGeom prst="rect">
+            <a:avLst/>
+          </a:prstGeom>
+        </p:spPr>
+        <p:txBody>
+          <a:bodyPr vert="horz" lIns="91440" tIns="45720" rIns="91440" bIns="45720" rtlCol="0"/>
+          <a:lstStyle>
+            <a:lvl1pPr algn="r">
+              <a:defRPr sz="1200"/>
+            </a:lvl1pPr>
+          </a:lstStyle>
+          <a:p>
+            <a:fld id="{FB900A15-AEB8-449A-9CEA-EB3D4E23BE5F}" type="datetimeFigureOut">
+              <a:rPr lang="pl-PL" smtClean="0"/>
+              <a:t>06.06.2017</a:t>
+            </a:fld>
+            <a:endParaRPr lang="pl-PL"/>
+          </a:p>
+        </p:txBody>
+      </p:sp>
+      <p:sp>
+        <p:nvSpPr>
+          <p:cNvPr id="4" name="Symbol zastępczy obrazu slajdu 3"/>
+          <p:cNvSpPr>
+            <a:spLocks noGrp="1" noRot="1" noChangeAspect="1"/>
+          </p:cNvSpPr>
+          <p:nvPr>
+            <p:ph type="sldImg" idx="2"/>
+          </p:nvPr>
+        </p:nvSpPr>
+        <p:spPr>
+          <a:xfrm>
+            <a:off x="1143000" y="685800"/>
+            <a:ext cx="4572000" cy="3429000"/>
+          </a:xfrm>
+          <a:prstGeom prst="rect">
+            <a:avLst/>
+          </a:prstGeom>
+          <a:noFill/>
+          <a:ln w="12700">
+            <a:solidFill>
+              <a:prstClr val="black"/>
+            </a:solidFill>
+          </a:ln>
+        </p:spPr>
+        <p:txBody>
+          <a:bodyPr vert="horz" lIns="91440" tIns="45720" rIns="91440" bIns="45720" rtlCol="0" anchor="ctr"/>
+          <a:lstStyle/>
+          <a:p>
+            <a:endParaRPr lang="pl-PL"/>
+          </a:p>
+        </p:txBody>
+      </p:sp>
+      <p:sp>
+        <p:nvSpPr>
+          <p:cNvPr id="5" name="Symbol zastępczy notatek 4"/>
+          <p:cNvSpPr>
+            <a:spLocks noGrp="1"/>
+          </p:cNvSpPr>
+          <p:nvPr>
+            <p:ph type="body" sz="quarter" idx="3"/>
+          </p:nvPr>
+        </p:nvSpPr>
+        <p:spPr>
+          <a:xfrm>
+            <a:off x="685800" y="4343400"/>
+            <a:ext cx="5486400" cy="4114800"/>
+          </a:xfrm>
+          <a:prstGeom prst="rect">
+            <a:avLst/>
+          </a:prstGeom>
+        </p:spPr>
+        <p:txBody>
+          <a:bodyPr vert="horz" lIns="91440" tIns="45720" rIns="91440" bIns="45720" rtlCol="0">
+            <a:normAutofit/>
+          </a:bodyPr>
+          <a:lstStyle/>
+          <a:p>
+            <a:pPr lvl="0"/>
+            <a:r>
+              <a:rPr lang="pl-PL" smtClean="0"/>
+              <a:t>Kliknij, aby edytować style wzorca tekstu</a:t>
+            </a:r>
+          </a:p>
+          <a:p>
+            <a:pPr lvl="1"/>
+            <a:r>
+              <a:rPr lang="pl-PL" smtClean="0"/>
+              <a:t>Drugi poziom</a:t>
+            </a:r>
+          </a:p>
+          <a:p>
+            <a:pPr lvl="2"/>
+            <a:r>
+              <a:rPr lang="pl-PL" smtClean="0"/>
+              <a:t>Trzeci poziom</a:t>
+            </a:r>
+          </a:p>
+          <a:p>
+            <a:pPr lvl="3"/>
+            <a:r>
+              <a:rPr lang="pl-PL" smtClean="0"/>
+              <a:t>Czwarty poziom</a:t>
+            </a:r>
+          </a:p>
+          <a:p>
+            <a:pPr lvl="4"/>
+            <a:r>
+              <a:rPr lang="pl-PL" smtClean="0"/>
+              <a:t>Piąty poziom</a:t>
+            </a:r>
+            <a:endParaRPr lang="pl-PL"/>
+          </a:p>
+        </p:txBody>
+      </p:sp>
+      <p:sp>
+        <p:nvSpPr>
+          <p:cNvPr id="6" name="Symbol zastępczy stopki 5"/>
+          <p:cNvSpPr>
+            <a:spLocks noGrp="1"/>
+          </p:cNvSpPr>
+          <p:nvPr>
+            <p:ph type="ftr" sz="quarter" idx="4"/>
+          </p:nvPr>
+        </p:nvSpPr>
+        <p:spPr>
+          <a:xfrm>
+            <a:off x="0" y="8685213"/>
+            <a:ext cx="2971800" cy="457200"/>
+          </a:xfrm>
+          <a:prstGeom prst="rect">
+            <a:avLst/>
+          </a:prstGeom>
+        </p:spPr>
+        <p:txBody>
+          <a:bodyPr vert="horz" lIns="91440" tIns="45720" rIns="91440" bIns="45720" rtlCol="0" anchor="b"/>
+          <a:lstStyle>
+            <a:lvl1pPr algn="l">
+              <a:defRPr sz="1200"/>
+            </a:lvl1pPr>
+          </a:lstStyle>
+          <a:p>
+            <a:endParaRPr lang="pl-PL"/>
+          </a:p>
+        </p:txBody>
+      </p:sp>
+      <p:sp>
+        <p:nvSpPr>
+          <p:cNvPr id="7" name="Symbol zastępczy numeru slajdu 6"/>
+          <p:cNvSpPr>
+            <a:spLocks noGrp="1"/>
+          </p:cNvSpPr>
+          <p:nvPr>
+            <p:ph type="sldNum" sz="quarter" idx="5"/>
+          </p:nvPr>
+        </p:nvSpPr>
+        <p:spPr>
+          <a:xfrm>
+            <a:off x="3884613" y="8685213"/>
+            <a:ext cx="2971800" cy="457200"/>
+          </a:xfrm>
+          <a:prstGeom prst="rect">
+            <a:avLst/>
+          </a:prstGeom>
+        </p:spPr>
+        <p:txBody>
+          <a:bodyPr vert="horz" lIns="91440" tIns="45720" rIns="91440" bIns="45720" rtlCol="0" anchor="b"/>
+          <a:lstStyle>
+            <a:lvl1pPr algn="r">
+              <a:defRPr sz="1200"/>
+            </a:lvl1pPr>
+          </a:lstStyle>
+          <a:p>
+            <a:fld id="{9AB5724F-1E8A-4AB6-AEE8-59C8D0D3AAE9}" type="slidenum">
+              <a:rPr lang="pl-PL" smtClean="0"/>
+              <a:t>‹#›</a:t>
+            </a:fld>
+            <a:endParaRPr lang="pl-PL"/>
+          </a:p>
+        </p:txBody>
+      </p:sp>
+    </p:spTree>
+  </p:cSld>
+  <p:clrMap bg1="lt1" tx1="dk1" bg2="lt2" tx2="dk2" accent1="accent1" accent2="accent2" accent3="accent3" accent4="accent4" accent5="accent5" accent6="accent6" hlink="hlink" folHlink="folHlink"/>
+  <p:notesStyle>
+    <a:lvl1pPr marL="0" algn="l" defTabSz="914400" rtl="0" eaLnBrk="1" latinLnBrk="0" hangingPunct="1">
+      <a:defRPr sz="1200" kern="1200">
+        <a:solidFill>
+          <a:schemeClr val="tx1"/>
+        </a:solidFill>
+        <a:latin typeface="+mn-lt"/>
+        <a:ea typeface="+mn-ea"/>
+        <a:cs typeface="+mn-cs"/>
+      </a:defRPr>
+    </a:lvl1pPr>
+    <a:lvl2pPr marL="457200" algn="l" defTabSz="914400" rtl="0" eaLnBrk="1" latinLnBrk="0" hangingPunct="1">
+      <a:defRPr sz="1200" kern="1200">
+        <a:solidFill>
+          <a:schemeClr val="tx1"/>
+        </a:solidFill>
+        <a:latin typeface="+mn-lt"/>
+        <a:ea typeface="+mn-ea"/>
+        <a:cs typeface="+mn-cs"/>
+      </a:defRPr>
+    </a:lvl2pPr>
+    <a:lvl3pPr marL="914400" algn="l" defTabSz="914400" rtl="0" eaLnBrk="1" latinLnBrk="0" hangingPunct="1">
+      <a:defRPr sz="1200" kern="1200">
+        <a:solidFill>
+          <a:schemeClr val="tx1"/>
+        </a:solidFill>
+        <a:latin typeface="+mn-lt"/>
+        <a:ea typeface="+mn-ea"/>
+        <a:cs typeface="+mn-cs"/>
+      </a:defRPr>
+    </a:lvl3pPr>
+    <a:lvl4pPr marL="1371600" algn="l" defTabSz="914400" rtl="0" eaLnBrk="1" latinLnBrk="0" hangingPunct="1">
+      <a:defRPr sz="1200" kern="1200">
+        <a:solidFill>
+          <a:schemeClr val="tx1"/>
+        </a:solidFill>
+        <a:latin typeface="+mn-lt"/>
+        <a:ea typeface="+mn-ea"/>
+        <a:cs typeface="+mn-cs"/>
+      </a:defRPr>
+    </a:lvl4pPr>
+    <a:lvl5pPr marL="1828800" algn="l" defTabSz="914400" rtl="0" eaLnBrk="1" latinLnBrk="0" hangingPunct="1">
+      <a:defRPr sz="1200" kern="1200">
+        <a:solidFill>
+          <a:schemeClr val="tx1"/>
+        </a:solidFill>
+        <a:latin typeface="+mn-lt"/>
+        <a:ea typeface="+mn-ea"/>
+        <a:cs typeface="+mn-cs"/>
+      </a:defRPr>
+    </a:lvl5pPr>
+    <a:lvl6pPr marL="2286000" algn="l" defTabSz="914400" rtl="0" eaLnBrk="1" latinLnBrk="0" hangingPunct="1">
+      <a:defRPr sz="1200" kern="1200">
+        <a:solidFill>
+          <a:schemeClr val="tx1"/>
+        </a:solidFill>
+        <a:latin typeface="+mn-lt"/>
+        <a:ea typeface="+mn-ea"/>
+        <a:cs typeface="+mn-cs"/>
+      </a:defRPr>
+    </a:lvl6pPr>
+    <a:lvl7pPr marL="2743200" algn="l" defTabSz="914400" rtl="0" eaLnBrk="1" latinLnBrk="0" hangingPunct="1">
+      <a:defRPr sz="1200" kern="1200">
+        <a:solidFill>
+          <a:schemeClr val="tx1"/>
+        </a:solidFill>
+        <a:latin typeface="+mn-lt"/>
+        <a:ea typeface="+mn-ea"/>
+        <a:cs typeface="+mn-cs"/>
+      </a:defRPr>
+    </a:lvl7pPr>
+    <a:lvl8pPr marL="3200400" algn="l" defTabSz="914400" rtl="0" eaLnBrk="1" latinLnBrk="0" hangingPunct="1">
+      <a:defRPr sz="1200" kern="1200">
+        <a:solidFill>
+          <a:schemeClr val="tx1"/>
+        </a:solidFill>
+        <a:latin typeface="+mn-lt"/>
+        <a:ea typeface="+mn-ea"/>
+        <a:cs typeface="+mn-cs"/>
+      </a:defRPr>
+    </a:lvl8pPr>
+    <a:lvl9pPr marL="3657600" algn="l" defTabSz="914400" rtl="0" eaLnBrk="1" latinLnBrk="0" hangingPunct="1">
+      <a:defRPr sz="1200" kern="1200">
+        <a:solidFill>
+          <a:schemeClr val="tx1"/>
+        </a:solidFill>
+        <a:latin typeface="+mn-lt"/>
+        <a:ea typeface="+mn-ea"/>
+        <a:cs typeface="+mn-cs"/>
+      </a:defRPr>
+    </a:lvl9pPr>
+  </p:notesStyle>
+</p:notesMaster>
+</file>
+
 <file path=ppt/slideLayouts/slideLayout1.xml><?xml version="1.0" encoding="utf-8"?>
 <p:sldLayout xmlns:a="http://schemas.openxmlformats.org/drawingml/2006/main" xmlns:r="http://schemas.openxmlformats.org/officeDocument/2006/relationships" xmlns:p="http://schemas.openxmlformats.org/presentationml/2006/main" showMasterSp="0" type="title" preserve="1">
   <p:cSld name="Slajd tytułowy">
@@ -261,7 +611,7 @@
           <a:bodyPr/>
           <a:lstStyle/>
           <a:p>
-            <a:fld id="{49EFF5BB-1405-4B98-868E-331A34A9DD4B}" type="datetimeFigureOut">
+            <a:fld id="{D332393A-6DBA-41B6-98E0-985AF5AC15E1}" type="datetime1">
               <a:rPr lang="pl-PL" smtClean="0"/>
               <a:t>06.06.2017</a:t>
             </a:fld>
@@ -1009,6 +1359,7 @@
           <a:p>
             <a:fld id="{FB49FE32-2457-4992-8806-C1CA0B468257}" type="slidenum">
               <a:rPr lang="pl-PL" smtClean="0"/>
+              <a:pPr/>
               <a:t>‹#›</a:t>
             </a:fld>
             <a:endParaRPr lang="pl-PL"/>
@@ -1130,7 +1481,7 @@
           <a:bodyPr/>
           <a:lstStyle/>
           <a:p>
-            <a:fld id="{49EFF5BB-1405-4B98-868E-331A34A9DD4B}" type="datetimeFigureOut">
+            <a:fld id="{BD4876A7-1926-4124-AD73-83CA9DD21856}" type="datetime1">
               <a:rPr lang="pl-PL" smtClean="0"/>
               <a:t>06.06.2017</a:t>
             </a:fld>
@@ -1174,6 +1525,7 @@
           <a:p>
             <a:fld id="{FB49FE32-2457-4992-8806-C1CA0B468257}" type="slidenum">
               <a:rPr lang="pl-PL" smtClean="0"/>
+              <a:pPr/>
               <a:t>‹#›</a:t>
             </a:fld>
             <a:endParaRPr lang="pl-PL"/>
@@ -1305,7 +1657,7 @@
           <a:bodyPr/>
           <a:lstStyle/>
           <a:p>
-            <a:fld id="{49EFF5BB-1405-4B98-868E-331A34A9DD4B}" type="datetimeFigureOut">
+            <a:fld id="{46F43C36-D578-4BFE-B5C3-C6B407751F13}" type="datetime1">
               <a:rPr lang="pl-PL" smtClean="0"/>
               <a:t>06.06.2017</a:t>
             </a:fld>
@@ -1349,6 +1701,7 @@
           <a:p>
             <a:fld id="{FB49FE32-2457-4992-8806-C1CA0B468257}" type="slidenum">
               <a:rPr lang="pl-PL" smtClean="0"/>
+              <a:pPr/>
               <a:t>‹#›</a:t>
             </a:fld>
             <a:endParaRPr lang="pl-PL"/>
@@ -1475,7 +1828,7 @@
           <a:bodyPr rtlCol="0"/>
           <a:lstStyle/>
           <a:p>
-            <a:fld id="{49EFF5BB-1405-4B98-868E-331A34A9DD4B}" type="datetimeFigureOut">
+            <a:fld id="{D7D7439E-968B-4839-AAA8-A42EED83950D}" type="datetime1">
               <a:rPr lang="pl-PL" smtClean="0"/>
               <a:t>06.06.2017</a:t>
             </a:fld>
@@ -1500,9 +1853,10 @@
           <a:p>
             <a:fld id="{FB49FE32-2457-4992-8806-C1CA0B468257}" type="slidenum">
               <a:rPr lang="pl-PL" smtClean="0"/>
+              <a:pPr/>
               <a:t>‹#›</a:t>
             </a:fld>
-            <a:endParaRPr lang="pl-PL"/>
+            <a:endParaRPr lang="pl-PL" dirty="0"/>
           </a:p>
         </p:txBody>
       </p:sp>
@@ -1685,7 +2039,7 @@
           <a:bodyPr/>
           <a:lstStyle/>
           <a:p>
-            <a:fld id="{49EFF5BB-1405-4B98-868E-331A34A9DD4B}" type="datetimeFigureOut">
+            <a:fld id="{4751392A-6A4A-4BA4-9075-53E88B8287D8}" type="datetime1">
               <a:rPr lang="pl-PL" smtClean="0"/>
               <a:t>06.06.2017</a:t>
             </a:fld>
@@ -2430,6 +2784,7 @@
           <a:p>
             <a:fld id="{FB49FE32-2457-4992-8806-C1CA0B468257}" type="slidenum">
               <a:rPr lang="pl-PL" smtClean="0"/>
+              <a:pPr/>
               <a:t>‹#›</a:t>
             </a:fld>
             <a:endParaRPr lang="pl-PL"/>
@@ -2499,7 +2854,7 @@
           <a:bodyPr/>
           <a:lstStyle/>
           <a:p>
-            <a:fld id="{49EFF5BB-1405-4B98-868E-331A34A9DD4B}" type="datetimeFigureOut">
+            <a:fld id="{892F46F1-8067-4B4A-BE3E-4A3DD4D12B07}" type="datetime1">
               <a:rPr lang="pl-PL" smtClean="0"/>
               <a:t>06.06.2017</a:t>
             </a:fld>
@@ -2543,6 +2898,7 @@
           <a:p>
             <a:fld id="{FB49FE32-2457-4992-8806-C1CA0B468257}" type="slidenum">
               <a:rPr lang="pl-PL" smtClean="0"/>
+              <a:pPr/>
               <a:t>‹#›</a:t>
             </a:fld>
             <a:endParaRPr lang="pl-PL"/>
@@ -2735,7 +3091,7 @@
           <a:bodyPr/>
           <a:lstStyle/>
           <a:p>
-            <a:fld id="{49EFF5BB-1405-4B98-868E-331A34A9DD4B}" type="datetimeFigureOut">
+            <a:fld id="{7B3C0D74-1804-40D6-AD47-EE170680EF55}" type="datetime1">
               <a:rPr lang="pl-PL" smtClean="0"/>
               <a:t>06.06.2017</a:t>
             </a:fld>
@@ -2779,6 +3135,7 @@
           <a:p>
             <a:fld id="{FB49FE32-2457-4992-8806-C1CA0B468257}" type="slidenum">
               <a:rPr lang="pl-PL" smtClean="0"/>
+              <a:pPr/>
               <a:t>‹#›</a:t>
             </a:fld>
             <a:endParaRPr lang="pl-PL"/>
@@ -3058,7 +3415,7 @@
           <a:bodyPr rtlCol="0"/>
           <a:lstStyle/>
           <a:p>
-            <a:fld id="{49EFF5BB-1405-4B98-868E-331A34A9DD4B}" type="datetimeFigureOut">
+            <a:fld id="{84D2ACD3-BCE1-408B-AB11-7BAAAD89EC6F}" type="datetime1">
               <a:rPr lang="pl-PL" smtClean="0"/>
               <a:t>06.06.2017</a:t>
             </a:fld>
@@ -3083,6 +3440,7 @@
           <a:p>
             <a:fld id="{FB49FE32-2457-4992-8806-C1CA0B468257}" type="slidenum">
               <a:rPr lang="pl-PL" smtClean="0"/>
+              <a:pPr/>
               <a:t>‹#›</a:t>
             </a:fld>
             <a:endParaRPr lang="pl-PL"/>
@@ -3148,7 +3506,7 @@
           <a:bodyPr/>
           <a:lstStyle/>
           <a:p>
-            <a:fld id="{49EFF5BB-1405-4B98-868E-331A34A9DD4B}" type="datetimeFigureOut">
+            <a:fld id="{B90C7D78-D83A-4C4E-A735-A874375C8EBA}" type="datetime1">
               <a:rPr lang="pl-PL" smtClean="0"/>
               <a:t>06.06.2017</a:t>
             </a:fld>
@@ -3192,6 +3550,7 @@
           <a:p>
             <a:fld id="{FB49FE32-2457-4992-8806-C1CA0B468257}" type="slidenum">
               <a:rPr lang="pl-PL" smtClean="0"/>
+              <a:pPr/>
               <a:t>‹#›</a:t>
             </a:fld>
             <a:endParaRPr lang="pl-PL"/>
@@ -3615,38 +3974,38 @@
           <a:p>
             <a:pPr lvl="0" eaLnBrk="1" latinLnBrk="0" hangingPunct="1"/>
             <a:r>
-              <a:rPr lang="pl-PL" smtClean="0"/>
+              <a:rPr lang="pl-PL" dirty="0" smtClean="0"/>
               <a:t>Kliknij, aby edytować style wzorca tekstu</a:t>
             </a:r>
           </a:p>
           <a:p>
             <a:pPr lvl="1" eaLnBrk="1" latinLnBrk="0" hangingPunct="1"/>
             <a:r>
-              <a:rPr lang="pl-PL" smtClean="0"/>
+              <a:rPr lang="pl-PL" dirty="0" smtClean="0"/>
               <a:t>Drugi poziom</a:t>
             </a:r>
           </a:p>
           <a:p>
             <a:pPr lvl="2" eaLnBrk="1" latinLnBrk="0" hangingPunct="1"/>
             <a:r>
-              <a:rPr lang="pl-PL" smtClean="0"/>
+              <a:rPr lang="pl-PL" dirty="0" smtClean="0"/>
               <a:t>Trzeci poziom</a:t>
             </a:r>
           </a:p>
           <a:p>
             <a:pPr lvl="3" eaLnBrk="1" latinLnBrk="0" hangingPunct="1"/>
             <a:r>
-              <a:rPr lang="pl-PL" smtClean="0"/>
+              <a:rPr lang="pl-PL" dirty="0" smtClean="0"/>
               <a:t>Czwarty poziom</a:t>
             </a:r>
           </a:p>
           <a:p>
             <a:pPr lvl="4" eaLnBrk="1" latinLnBrk="0" hangingPunct="1"/>
             <a:r>
-              <a:rPr lang="pl-PL" smtClean="0"/>
+              <a:rPr lang="pl-PL" dirty="0" smtClean="0"/>
               <a:t>Piąty poziom</a:t>
             </a:r>
-            <a:endParaRPr kumimoji="0" lang="en-US"/>
+            <a:endParaRPr kumimoji="0" lang="en-US" dirty="0"/>
           </a:p>
         </p:txBody>
       </p:sp>
@@ -3665,7 +4024,7 @@
           <a:bodyPr rtlCol="0"/>
           <a:lstStyle/>
           <a:p>
-            <a:fld id="{49EFF5BB-1405-4B98-868E-331A34A9DD4B}" type="datetimeFigureOut">
+            <a:fld id="{635A2E3A-50F0-4974-B90D-848CC8E79139}" type="datetime1">
               <a:rPr lang="pl-PL" smtClean="0"/>
               <a:t>06.06.2017</a:t>
             </a:fld>
@@ -3686,13 +4045,17 @@
         <p:spPr/>
         <p:txBody>
           <a:bodyPr rtlCol="0"/>
-          <a:lstStyle/>
-          <a:p>
-            <a:fld id="{FB49FE32-2457-4992-8806-C1CA0B468257}" type="slidenum">
-              <a:rPr lang="pl-PL" smtClean="0"/>
-              <a:t>‹#›</a:t>
-            </a:fld>
-            <a:endParaRPr lang="pl-PL"/>
+          <a:lstStyle>
+            <a:lvl1pPr>
+              <a:defRPr/>
+            </a:lvl1pPr>
+          </a:lstStyle>
+          <a:p>
+            <a:r>
+              <a:rPr lang="pl-PL" dirty="0" smtClean="0"/>
+              <a:t>1</a:t>
+            </a:r>
+            <a:endParaRPr lang="pl-PL" dirty="0"/>
           </a:p>
         </p:txBody>
       </p:sp>
@@ -4176,7 +4539,7 @@
           <a:bodyPr rtlCol="0"/>
           <a:lstStyle/>
           <a:p>
-            <a:fld id="{49EFF5BB-1405-4B98-868E-331A34A9DD4B}" type="datetimeFigureOut">
+            <a:fld id="{39BE1351-BBF9-4B4F-ACA3-8966427C6498}" type="datetime1">
               <a:rPr lang="pl-PL" smtClean="0"/>
               <a:t>06.06.2017</a:t>
             </a:fld>
@@ -4201,6 +4564,7 @@
           <a:p>
             <a:fld id="{FB49FE32-2457-4992-8806-C1CA0B468257}" type="slidenum">
               <a:rPr lang="pl-PL" smtClean="0"/>
+              <a:pPr/>
               <a:t>‹#›</a:t>
             </a:fld>
             <a:endParaRPr lang="pl-PL"/>
@@ -4421,7 +4785,7 @@
             </a:lvl1pPr>
           </a:lstStyle>
           <a:p>
-            <a:fld id="{49EFF5BB-1405-4B98-868E-331A34A9DD4B}" type="datetimeFigureOut">
+            <a:fld id="{0EEE8D2F-7C2A-46ED-B58E-C1AB30A0F7C9}" type="datetime1">
               <a:rPr lang="pl-PL" smtClean="0"/>
               <a:t>06.06.2017</a:t>
             </a:fld>
@@ -4699,6 +5063,7 @@
           <a:p>
             <a:fld id="{FB49FE32-2457-4992-8806-C1CA0B468257}" type="slidenum">
               <a:rPr lang="pl-PL" smtClean="0"/>
+              <a:pPr/>
               <a:t>‹#›</a:t>
             </a:fld>
             <a:endParaRPr lang="pl-PL"/>
@@ -4721,6 +5086,7 @@
     <p:sldLayoutId id="2147483718" r:id="rId10"/>
     <p:sldLayoutId id="2147483719" r:id="rId11"/>
   </p:sldLayoutIdLst>
+  <p:hf hdr="0" ftr="0" dt="0"/>
   <p:txStyles>
     <p:titleStyle>
       <a:lvl1pPr algn="l" rtl="0" eaLnBrk="1" latinLnBrk="0" hangingPunct="1">
@@ -5038,7 +5404,12 @@
             <p:ph type="ctrTitle"/>
           </p:nvPr>
         </p:nvSpPr>
-        <p:spPr/>
+        <p:spPr>
+          <a:xfrm>
+            <a:off x="2285984" y="4500570"/>
+            <a:ext cx="6172200" cy="1357322"/>
+          </a:xfrm>
+        </p:spPr>
         <p:txBody>
           <a:bodyPr>
             <a:normAutofit fontScale="90000"/>
@@ -5113,15 +5484,203 @@
             </a:r>
             <a:r>
               <a:rPr lang="pl-PL" sz="3100" dirty="0" smtClean="0"/>
-              <a:t> Problem</a:t>
-            </a:r>
-            <a:r>
-              <a:rPr lang="pl-PL" dirty="0" smtClean="0"/>
+              <a:t> </a:t>
+            </a:r>
+            <a:r>
+              <a:rPr lang="pl-PL" sz="3100" dirty="0" smtClean="0"/>
+              <a:t>Problem</a:t>
+            </a:r>
+            <a:br>
+              <a:rPr lang="pl-PL" sz="3100" dirty="0" smtClean="0"/>
+            </a:br>
+            <a:r>
+              <a:rPr lang="pl-PL" sz="3100" dirty="0" smtClean="0"/>
               <a:t/>
             </a:r>
             <a:br>
-              <a:rPr lang="pl-PL" dirty="0" smtClean="0"/>
+              <a:rPr lang="pl-PL" sz="3100" dirty="0" smtClean="0"/>
             </a:br>
+            <a:r>
+              <a:rPr lang="pl-PL" sz="3100" dirty="0" smtClean="0"/>
+              <a:t/>
+            </a:r>
+            <a:br>
+              <a:rPr lang="pl-PL" sz="3100" dirty="0" smtClean="0"/>
+            </a:br>
+            <a:r>
+              <a:rPr lang="pl-PL" dirty="0" smtClean="0"/>
+              <a:t/>
+            </a:r>
+            <a:br>
+              <a:rPr lang="pl-PL" dirty="0" smtClean="0"/>
+            </a:br>
+            <a:endParaRPr lang="pl-PL" dirty="0"/>
+          </a:p>
+        </p:txBody>
+      </p:sp>
+      <p:sp>
+        <p:nvSpPr>
+          <p:cNvPr id="4" name="Symbol zastępczy numeru slajdu 3"/>
+          <p:cNvSpPr>
+            <a:spLocks noGrp="1"/>
+          </p:cNvSpPr>
+          <p:nvPr>
+            <p:ph type="sldNum" sz="quarter" idx="12"/>
+          </p:nvPr>
+        </p:nvSpPr>
+        <p:spPr/>
+        <p:txBody>
+          <a:bodyPr/>
+          <a:lstStyle/>
+          <a:p>
+            <a:fld id="{FB49FE32-2457-4992-8806-C1CA0B468257}" type="slidenum">
+              <a:rPr lang="pl-PL" smtClean="0"/>
+              <a:pPr/>
+              <a:t>1</a:t>
+            </a:fld>
+            <a:endParaRPr lang="pl-PL"/>
+          </a:p>
+        </p:txBody>
+      </p:sp>
+      <p:sp>
+        <p:nvSpPr>
+          <p:cNvPr id="5" name="pole tekstowe 4"/>
+          <p:cNvSpPr txBox="1"/>
+          <p:nvPr/>
+        </p:nvSpPr>
+        <p:spPr>
+          <a:xfrm>
+            <a:off x="5214942" y="4857760"/>
+            <a:ext cx="2714644" cy="1169551"/>
+          </a:xfrm>
+          <a:prstGeom prst="rect">
+            <a:avLst/>
+          </a:prstGeom>
+          <a:noFill/>
+        </p:spPr>
+        <p:txBody>
+          <a:bodyPr wrap="square" rtlCol="0">
+            <a:spAutoFit/>
+          </a:bodyPr>
+          <a:lstStyle/>
+          <a:p>
+            <a:pPr algn="r"/>
+            <a:r>
+              <a:rPr lang="pl-PL" sz="1400" b="1" cap="small" dirty="0" smtClean="0">
+                <a:solidFill>
+                  <a:srgbClr val="575F6D"/>
+                </a:solidFill>
+                <a:ea typeface="+mj-ea"/>
+                <a:cs typeface="+mj-cs"/>
+              </a:rPr>
+              <a:t>by:</a:t>
+            </a:r>
+            <a:r>
+              <a:rPr lang="pl-PL" sz="1400" cap="small" dirty="0" smtClean="0">
+                <a:solidFill>
+                  <a:srgbClr val="575F6D"/>
+                </a:solidFill>
+                <a:ea typeface="+mj-ea"/>
+                <a:cs typeface="+mj-cs"/>
+              </a:rPr>
+              <a:t/>
+            </a:r>
+            <a:br>
+              <a:rPr lang="pl-PL" sz="1400" cap="small" dirty="0" smtClean="0">
+                <a:solidFill>
+                  <a:srgbClr val="575F6D"/>
+                </a:solidFill>
+                <a:ea typeface="+mj-ea"/>
+                <a:cs typeface="+mj-cs"/>
+              </a:rPr>
+            </a:br>
+            <a:r>
+              <a:rPr lang="pl-PL" sz="1400" cap="small" dirty="0" smtClean="0">
+                <a:solidFill>
+                  <a:srgbClr val="575F6D"/>
+                </a:solidFill>
+                <a:ea typeface="+mj-ea"/>
+                <a:cs typeface="+mj-cs"/>
+              </a:rPr>
+              <a:t>Aleksander Kuśmierczyk</a:t>
+            </a:r>
+            <a:br>
+              <a:rPr lang="pl-PL" sz="1400" cap="small" dirty="0" smtClean="0">
+                <a:solidFill>
+                  <a:srgbClr val="575F6D"/>
+                </a:solidFill>
+                <a:ea typeface="+mj-ea"/>
+                <a:cs typeface="+mj-cs"/>
+              </a:rPr>
+            </a:br>
+            <a:r>
+              <a:rPr lang="pl-PL" sz="1400" cap="small" dirty="0" smtClean="0">
+                <a:solidFill>
+                  <a:srgbClr val="575F6D"/>
+                </a:solidFill>
+                <a:ea typeface="+mj-ea"/>
+                <a:cs typeface="+mj-cs"/>
+              </a:rPr>
+              <a:t>Mikołaj Słoń</a:t>
+            </a:r>
+            <a:br>
+              <a:rPr lang="pl-PL" sz="1400" cap="small" dirty="0" smtClean="0">
+                <a:solidFill>
+                  <a:srgbClr val="575F6D"/>
+                </a:solidFill>
+                <a:ea typeface="+mj-ea"/>
+                <a:cs typeface="+mj-cs"/>
+              </a:rPr>
+            </a:br>
+            <a:r>
+              <a:rPr lang="pl-PL" sz="1400" cap="small" dirty="0" smtClean="0">
+                <a:solidFill>
+                  <a:srgbClr val="575F6D"/>
+                </a:solidFill>
+                <a:ea typeface="+mj-ea"/>
+                <a:cs typeface="+mj-cs"/>
+              </a:rPr>
+              <a:t>Mateusz </a:t>
+            </a:r>
+            <a:r>
+              <a:rPr lang="pl-PL" sz="1400" cap="small" dirty="0" err="1" smtClean="0">
+                <a:solidFill>
+                  <a:srgbClr val="575F6D"/>
+                </a:solidFill>
+                <a:ea typeface="+mj-ea"/>
+                <a:cs typeface="+mj-cs"/>
+              </a:rPr>
+              <a:t>Szperna</a:t>
+            </a:r>
+            <a:r>
+              <a:rPr lang="pl-PL" sz="1400" cap="small" dirty="0" smtClean="0">
+                <a:solidFill>
+                  <a:srgbClr val="575F6D"/>
+                </a:solidFill>
+                <a:ea typeface="+mj-ea"/>
+                <a:cs typeface="+mj-cs"/>
+              </a:rPr>
+              <a:t/>
+            </a:r>
+            <a:br>
+              <a:rPr lang="pl-PL" sz="1400" cap="small" dirty="0" smtClean="0">
+                <a:solidFill>
+                  <a:srgbClr val="575F6D"/>
+                </a:solidFill>
+                <a:ea typeface="+mj-ea"/>
+                <a:cs typeface="+mj-cs"/>
+              </a:rPr>
+            </a:br>
+            <a:r>
+              <a:rPr lang="pl-PL" sz="1400" cap="small" dirty="0" smtClean="0">
+                <a:solidFill>
+                  <a:srgbClr val="575F6D"/>
+                </a:solidFill>
+                <a:ea typeface="+mj-ea"/>
+                <a:cs typeface="+mj-cs"/>
+              </a:rPr>
+              <a:t>Kornel Żaba</a:t>
+            </a:r>
             <a:endParaRPr lang="pl-PL" dirty="0"/>
           </a:p>
         </p:txBody>
@@ -5391,6 +5950,30 @@
           </a:prstGeom>
         </p:spPr>
       </p:pic>
+      <p:sp>
+        <p:nvSpPr>
+          <p:cNvPr id="7" name="Symbol zastępczy numeru slajdu 6"/>
+          <p:cNvSpPr>
+            <a:spLocks noGrp="1"/>
+          </p:cNvSpPr>
+          <p:nvPr>
+            <p:ph type="sldNum" sz="quarter" idx="15"/>
+          </p:nvPr>
+        </p:nvSpPr>
+        <p:spPr/>
+        <p:txBody>
+          <a:bodyPr/>
+          <a:lstStyle/>
+          <a:p>
+            <a:fld id="{FB49FE32-2457-4992-8806-C1CA0B468257}" type="slidenum">
+              <a:rPr lang="pl-PL" smtClean="0"/>
+              <a:pPr/>
+              <a:t>10</a:t>
+            </a:fld>
+            <a:endParaRPr lang="pl-PL" dirty="0"/>
+          </a:p>
+        </p:txBody>
+      </p:sp>
     </p:spTree>
   </p:cSld>
   <p:clrMapOvr>
@@ -5589,6 +6172,30 @@
           </a:prstGeom>
         </p:spPr>
       </p:pic>
+      <p:sp>
+        <p:nvSpPr>
+          <p:cNvPr id="6" name="Symbol zastępczy numeru slajdu 5"/>
+          <p:cNvSpPr>
+            <a:spLocks noGrp="1"/>
+          </p:cNvSpPr>
+          <p:nvPr>
+            <p:ph type="sldNum" sz="quarter" idx="15"/>
+          </p:nvPr>
+        </p:nvSpPr>
+        <p:spPr/>
+        <p:txBody>
+          <a:bodyPr/>
+          <a:lstStyle/>
+          <a:p>
+            <a:fld id="{FB49FE32-2457-4992-8806-C1CA0B468257}" type="slidenum">
+              <a:rPr lang="pl-PL" smtClean="0"/>
+              <a:pPr/>
+              <a:t>11</a:t>
+            </a:fld>
+            <a:endParaRPr lang="pl-PL" dirty="0"/>
+          </a:p>
+        </p:txBody>
+      </p:sp>
     </p:spTree>
   </p:cSld>
   <p:clrMapOvr>
@@ -5820,6 +6427,30 @@
           </a:prstGeom>
         </p:spPr>
       </p:pic>
+      <p:sp>
+        <p:nvSpPr>
+          <p:cNvPr id="6" name="Symbol zastępczy numeru slajdu 5"/>
+          <p:cNvSpPr>
+            <a:spLocks noGrp="1"/>
+          </p:cNvSpPr>
+          <p:nvPr>
+            <p:ph type="sldNum" sz="quarter" idx="15"/>
+          </p:nvPr>
+        </p:nvSpPr>
+        <p:spPr/>
+        <p:txBody>
+          <a:bodyPr/>
+          <a:lstStyle/>
+          <a:p>
+            <a:fld id="{FB49FE32-2457-4992-8806-C1CA0B468257}" type="slidenum">
+              <a:rPr lang="pl-PL" smtClean="0"/>
+              <a:pPr/>
+              <a:t>12</a:t>
+            </a:fld>
+            <a:endParaRPr lang="pl-PL" dirty="0"/>
+          </a:p>
+        </p:txBody>
+      </p:sp>
     </p:spTree>
   </p:cSld>
   <p:clrMapOvr>
@@ -6104,6 +6735,30 @@
           </a:prstGeom>
         </p:spPr>
       </p:pic>
+      <p:sp>
+        <p:nvSpPr>
+          <p:cNvPr id="6" name="Symbol zastępczy numeru slajdu 5"/>
+          <p:cNvSpPr>
+            <a:spLocks noGrp="1"/>
+          </p:cNvSpPr>
+          <p:nvPr>
+            <p:ph type="sldNum" sz="quarter" idx="15"/>
+          </p:nvPr>
+        </p:nvSpPr>
+        <p:spPr/>
+        <p:txBody>
+          <a:bodyPr/>
+          <a:lstStyle/>
+          <a:p>
+            <a:fld id="{FB49FE32-2457-4992-8806-C1CA0B468257}" type="slidenum">
+              <a:rPr lang="pl-PL" smtClean="0"/>
+              <a:pPr/>
+              <a:t>13</a:t>
+            </a:fld>
+            <a:endParaRPr lang="pl-PL" dirty="0"/>
+          </a:p>
+        </p:txBody>
+      </p:sp>
     </p:spTree>
   </p:cSld>
   <p:clrMapOvr>
@@ -6345,6 +7000,30 @@
               <a:rPr lang="pl-PL" dirty="0" err="1" smtClean="0"/>
               <a:t>intuitive</a:t>
             </a:r>
+            <a:endParaRPr lang="pl-PL" dirty="0"/>
+          </a:p>
+        </p:txBody>
+      </p:sp>
+      <p:sp>
+        <p:nvSpPr>
+          <p:cNvPr id="5" name="Symbol zastępczy numeru slajdu 4"/>
+          <p:cNvSpPr>
+            <a:spLocks noGrp="1"/>
+          </p:cNvSpPr>
+          <p:nvPr>
+            <p:ph type="sldNum" sz="quarter" idx="15"/>
+          </p:nvPr>
+        </p:nvSpPr>
+        <p:spPr/>
+        <p:txBody>
+          <a:bodyPr/>
+          <a:lstStyle/>
+          <a:p>
+            <a:fld id="{FB49FE32-2457-4992-8806-C1CA0B468257}" type="slidenum">
+              <a:rPr lang="pl-PL" smtClean="0"/>
+              <a:pPr/>
+              <a:t>14</a:t>
+            </a:fld>
             <a:endParaRPr lang="pl-PL" dirty="0"/>
           </a:p>
         </p:txBody>
@@ -6431,6 +7110,30 @@
           </a:xfrm>
         </p:spPr>
       </p:pic>
+      <p:sp>
+        <p:nvSpPr>
+          <p:cNvPr id="6" name="Symbol zastępczy numeru slajdu 5"/>
+          <p:cNvSpPr>
+            <a:spLocks noGrp="1"/>
+          </p:cNvSpPr>
+          <p:nvPr>
+            <p:ph type="sldNum" sz="quarter" idx="15"/>
+          </p:nvPr>
+        </p:nvSpPr>
+        <p:spPr/>
+        <p:txBody>
+          <a:bodyPr/>
+          <a:lstStyle/>
+          <a:p>
+            <a:fld id="{FB49FE32-2457-4992-8806-C1CA0B468257}" type="slidenum">
+              <a:rPr lang="pl-PL" smtClean="0"/>
+              <a:pPr/>
+              <a:t>15</a:t>
+            </a:fld>
+            <a:endParaRPr lang="pl-PL" dirty="0"/>
+          </a:p>
+        </p:txBody>
+      </p:sp>
     </p:spTree>
   </p:cSld>
   <p:clrMapOvr>
@@ -6656,6 +7359,30 @@
           </a:prstGeom>
         </p:spPr>
       </p:pic>
+      <p:sp>
+        <p:nvSpPr>
+          <p:cNvPr id="6" name="Symbol zastępczy numeru slajdu 5"/>
+          <p:cNvSpPr>
+            <a:spLocks noGrp="1"/>
+          </p:cNvSpPr>
+          <p:nvPr>
+            <p:ph type="sldNum" sz="quarter" idx="15"/>
+          </p:nvPr>
+        </p:nvSpPr>
+        <p:spPr/>
+        <p:txBody>
+          <a:bodyPr/>
+          <a:lstStyle/>
+          <a:p>
+            <a:fld id="{FB49FE32-2457-4992-8806-C1CA0B468257}" type="slidenum">
+              <a:rPr lang="pl-PL" smtClean="0"/>
+              <a:pPr/>
+              <a:t>16</a:t>
+            </a:fld>
+            <a:endParaRPr lang="pl-PL" dirty="0"/>
+          </a:p>
+        </p:txBody>
+      </p:sp>
     </p:spTree>
   </p:cSld>
   <p:clrMapOvr>
@@ -6855,6 +7582,30 @@
           <a:effectLst/>
         </p:spPr>
       </p:pic>
+      <p:sp>
+        <p:nvSpPr>
+          <p:cNvPr id="6" name="Symbol zastępczy numeru slajdu 5"/>
+          <p:cNvSpPr>
+            <a:spLocks noGrp="1"/>
+          </p:cNvSpPr>
+          <p:nvPr>
+            <p:ph type="sldNum" sz="quarter" idx="15"/>
+          </p:nvPr>
+        </p:nvSpPr>
+        <p:spPr/>
+        <p:txBody>
+          <a:bodyPr/>
+          <a:lstStyle/>
+          <a:p>
+            <a:fld id="{FB49FE32-2457-4992-8806-C1CA0B468257}" type="slidenum">
+              <a:rPr lang="pl-PL" smtClean="0"/>
+              <a:pPr/>
+              <a:t>17</a:t>
+            </a:fld>
+            <a:endParaRPr lang="pl-PL" dirty="0"/>
+          </a:p>
+        </p:txBody>
+      </p:sp>
     </p:spTree>
   </p:cSld>
   <p:clrMapOvr>
@@ -7082,6 +7833,30 @@
           </a:prstGeom>
         </p:spPr>
       </p:pic>
+      <p:sp>
+        <p:nvSpPr>
+          <p:cNvPr id="6" name="Symbol zastępczy numeru slajdu 5"/>
+          <p:cNvSpPr>
+            <a:spLocks noGrp="1"/>
+          </p:cNvSpPr>
+          <p:nvPr>
+            <p:ph type="sldNum" sz="quarter" idx="15"/>
+          </p:nvPr>
+        </p:nvSpPr>
+        <p:spPr/>
+        <p:txBody>
+          <a:bodyPr/>
+          <a:lstStyle/>
+          <a:p>
+            <a:fld id="{FB49FE32-2457-4992-8806-C1CA0B468257}" type="slidenum">
+              <a:rPr lang="pl-PL" smtClean="0"/>
+              <a:pPr/>
+              <a:t>18</a:t>
+            </a:fld>
+            <a:endParaRPr lang="pl-PL" dirty="0"/>
+          </a:p>
+        </p:txBody>
+      </p:sp>
     </p:spTree>
   </p:cSld>
   <p:clrMapOvr>
@@ -7207,13 +7982,7 @@
               <a:rPr lang="pl-PL" dirty="0" smtClean="0">
                 <a:hlinkClick r:id="rId2"/>
               </a:rPr>
-              <a:t>https://</a:t>
-            </a:r>
-            <a:r>
-              <a:rPr lang="pl-PL" dirty="0" smtClean="0">
-                <a:hlinkClick r:id="rId2"/>
-              </a:rPr>
-              <a:t>github.com/Averdose/FantasyKnapsack</a:t>
+              <a:t>https://github.com/Averdose/FantasyKnapsack</a:t>
             </a:r>
             <a:r>
               <a:rPr lang="pl-PL" dirty="0" smtClean="0"/>
@@ -7256,13 +8025,7 @@
               <a:rPr lang="pl-PL" dirty="0" smtClean="0">
                 <a:hlinkClick r:id="rId3"/>
               </a:rPr>
-              <a:t>https://www.fifaindex.com</a:t>
-            </a:r>
-            <a:r>
-              <a:rPr lang="pl-PL" dirty="0" smtClean="0">
-                <a:hlinkClick r:id="rId3"/>
-              </a:rPr>
-              <a:t>/</a:t>
+              <a:t>https://www.fifaindex.com/</a:t>
             </a:r>
             <a:endParaRPr lang="pl-PL" dirty="0" smtClean="0"/>
           </a:p>
@@ -7272,18 +8035,36 @@
               <a:rPr lang="pl-PL" dirty="0" smtClean="0">
                 <a:hlinkClick r:id="rId4"/>
               </a:rPr>
-              <a:t>https://</a:t>
-            </a:r>
-            <a:r>
-              <a:rPr lang="pl-PL" dirty="0" smtClean="0">
-                <a:hlinkClick r:id="rId4"/>
-              </a:rPr>
-              <a:t>www.kaggle.com/artimous/complete-fifa-2017-player-dataset-global</a:t>
-            </a:r>
-            <a:r>
-              <a:rPr lang="pl-PL" dirty="0" smtClean="0"/>
-              <a:t> </a:t>
-            </a:r>
+              <a:t>https://www.kaggle.com/artimous/complete-fifa-2017-player-dataset-global</a:t>
+            </a:r>
+            <a:r>
+              <a:rPr lang="pl-PL" dirty="0" smtClean="0"/>
+              <a:t> </a:t>
+            </a:r>
+          </a:p>
+        </p:txBody>
+      </p:sp>
+      <p:sp>
+        <p:nvSpPr>
+          <p:cNvPr id="5" name="Symbol zastępczy numeru slajdu 4"/>
+          <p:cNvSpPr>
+            <a:spLocks noGrp="1"/>
+          </p:cNvSpPr>
+          <p:nvPr>
+            <p:ph type="sldNum" sz="quarter" idx="15"/>
+          </p:nvPr>
+        </p:nvSpPr>
+        <p:spPr/>
+        <p:txBody>
+          <a:bodyPr/>
+          <a:lstStyle/>
+          <a:p>
+            <a:fld id="{FB49FE32-2457-4992-8806-C1CA0B468257}" type="slidenum">
+              <a:rPr lang="pl-PL" smtClean="0"/>
+              <a:pPr/>
+              <a:t>19</a:t>
+            </a:fld>
+            <a:endParaRPr lang="pl-PL" dirty="0"/>
           </a:p>
         </p:txBody>
       </p:sp>
@@ -7384,35 +8165,19 @@
           <a:p>
             <a:r>
               <a:rPr lang="en-US" dirty="0" smtClean="0"/>
-              <a:t>Fill </a:t>
-            </a:r>
+              <a:t>Fill the knapsack with items</a:t>
+            </a:r>
+          </a:p>
+          <a:p>
             <a:r>
               <a:rPr lang="en-US" dirty="0" smtClean="0"/>
-              <a:t>the knapsack with items</a:t>
+              <a:t>Maximize total value</a:t>
             </a:r>
           </a:p>
           <a:p>
             <a:r>
               <a:rPr lang="en-US" dirty="0" smtClean="0"/>
-              <a:t>Maximize </a:t>
-            </a:r>
-            <a:r>
-              <a:rPr lang="en-US" dirty="0" smtClean="0"/>
-              <a:t>total value</a:t>
-            </a:r>
-          </a:p>
-          <a:p>
-            <a:r>
-              <a:rPr lang="en-US" dirty="0" smtClean="0"/>
-              <a:t>Keep </a:t>
-            </a:r>
-            <a:r>
-              <a:rPr lang="en-US" dirty="0" smtClean="0"/>
-              <a:t>total weight within </a:t>
-            </a:r>
-            <a:r>
-              <a:rPr lang="en-US" dirty="0" smtClean="0"/>
-              <a:t>knapsack’s</a:t>
+              <a:t>Keep total weight within knapsack’s</a:t>
             </a:r>
             <a:r>
               <a:rPr lang="pl-PL" dirty="0" smtClean="0"/>
@@ -7446,6 +8211,30 @@
           </a:prstGeom>
         </p:spPr>
       </p:pic>
+      <p:sp>
+        <p:nvSpPr>
+          <p:cNvPr id="8" name="Symbol zastępczy numeru slajdu 7"/>
+          <p:cNvSpPr>
+            <a:spLocks noGrp="1"/>
+          </p:cNvSpPr>
+          <p:nvPr>
+            <p:ph type="sldNum" sz="quarter" idx="15"/>
+          </p:nvPr>
+        </p:nvSpPr>
+        <p:spPr/>
+        <p:txBody>
+          <a:bodyPr/>
+          <a:lstStyle/>
+          <a:p>
+            <a:fld id="{FB49FE32-2457-4992-8806-C1CA0B468257}" type="slidenum">
+              <a:rPr lang="pl-PL" smtClean="0"/>
+              <a:pPr/>
+              <a:t>2</a:t>
+            </a:fld>
+            <a:endParaRPr lang="pl-PL" dirty="0"/>
+          </a:p>
+        </p:txBody>
+      </p:sp>
     </p:spTree>
   </p:cSld>
   <p:clrMapOvr>
@@ -7580,13 +8369,7 @@
               <a:rPr lang="pl-PL" dirty="0" smtClean="0">
                 <a:hlinkClick r:id="rId5"/>
               </a:rPr>
-              <a:t>http://</a:t>
-            </a:r>
-            <a:r>
-              <a:rPr lang="pl-PL" dirty="0" smtClean="0">
-                <a:hlinkClick r:id="rId5"/>
-              </a:rPr>
-              <a:t>www.gettyimages.com</a:t>
+              <a:t>http://www.gettyimages.com</a:t>
             </a:r>
             <a:r>
               <a:rPr lang="pl-PL" dirty="0" smtClean="0"/>
@@ -7609,19 +8392,12 @@
               <a:rPr lang="pl-PL" dirty="0" smtClean="0">
                 <a:hlinkClick r:id="rId7"/>
               </a:rPr>
-              <a:t>http://nicholasburroughs.com</a:t>
-            </a:r>
-            <a:r>
-              <a:rPr lang="pl-PL" dirty="0" smtClean="0">
-                <a:hlinkClick r:id="rId7"/>
-              </a:rPr>
-              <a:t>/</a:t>
-            </a:r>
-            <a:r>
-              <a:rPr lang="pl-PL" dirty="0" smtClean="0"/>
-              <a:t> </a:t>
-            </a:r>
-            <a:endParaRPr lang="pl-PL" dirty="0" smtClean="0"/>
+              <a:t>http://nicholasburroughs.com/</a:t>
+            </a:r>
+            <a:r>
+              <a:rPr lang="pl-PL" dirty="0" smtClean="0"/>
+              <a:t> </a:t>
+            </a:r>
           </a:p>
           <a:p>
             <a:pPr lvl="1"/>
@@ -7639,6 +8415,30 @@
             <a:endParaRPr lang="pl-PL" dirty="0" smtClean="0"/>
           </a:p>
           <a:p>
+            <a:endParaRPr lang="pl-PL" dirty="0"/>
+          </a:p>
+        </p:txBody>
+      </p:sp>
+      <p:sp>
+        <p:nvSpPr>
+          <p:cNvPr id="5" name="Symbol zastępczy numeru slajdu 4"/>
+          <p:cNvSpPr>
+            <a:spLocks noGrp="1"/>
+          </p:cNvSpPr>
+          <p:nvPr>
+            <p:ph type="sldNum" sz="quarter" idx="15"/>
+          </p:nvPr>
+        </p:nvSpPr>
+        <p:spPr/>
+        <p:txBody>
+          <a:bodyPr/>
+          <a:lstStyle/>
+          <a:p>
+            <a:fld id="{FB49FE32-2457-4992-8806-C1CA0B468257}" type="slidenum">
+              <a:rPr lang="pl-PL" smtClean="0"/>
+              <a:pPr/>
+              <a:t>20</a:t>
+            </a:fld>
             <a:endParaRPr lang="pl-PL" dirty="0"/>
           </a:p>
         </p:txBody>
@@ -7849,39 +8649,27 @@
             <a:pPr lvl="1"/>
             <a:r>
               <a:rPr lang="pl-PL" i="1" dirty="0" smtClean="0"/>
-              <a:t>n</a:t>
-            </a:r>
+              <a:t>n – </a:t>
+            </a:r>
+            <a:r>
+              <a:rPr lang="pl-PL" dirty="0" err="1" smtClean="0"/>
+              <a:t>number</a:t>
+            </a:r>
+            <a:r>
+              <a:rPr lang="pl-PL" dirty="0" smtClean="0"/>
+              <a:t> of </a:t>
+            </a:r>
+            <a:r>
+              <a:rPr lang="pl-PL" dirty="0" err="1" smtClean="0"/>
+              <a:t>items</a:t>
+            </a:r>
+            <a:endParaRPr lang="pl-PL" dirty="0" smtClean="0"/>
+          </a:p>
+          <a:p>
+            <a:pPr lvl="1"/>
             <a:r>
               <a:rPr lang="pl-PL" i="1" dirty="0" smtClean="0"/>
-              <a:t> – </a:t>
-            </a:r>
-            <a:r>
-              <a:rPr lang="pl-PL" dirty="0" err="1" smtClean="0"/>
-              <a:t>number</a:t>
-            </a:r>
-            <a:r>
-              <a:rPr lang="pl-PL" dirty="0" smtClean="0"/>
-              <a:t> of </a:t>
-            </a:r>
-            <a:r>
-              <a:rPr lang="pl-PL" dirty="0" err="1" smtClean="0"/>
-              <a:t>items</a:t>
-            </a:r>
-            <a:endParaRPr lang="pl-PL" dirty="0" smtClean="0"/>
-          </a:p>
-          <a:p>
-            <a:pPr lvl="1"/>
-            <a:r>
-              <a:rPr lang="pl-PL" i="1" dirty="0" smtClean="0"/>
-              <a:t>W </a:t>
-            </a:r>
-            <a:r>
-              <a:rPr lang="pl-PL" i="1" dirty="0" smtClean="0"/>
-              <a:t>–</a:t>
-            </a:r>
-            <a:r>
-              <a:rPr lang="pl-PL" i="1" dirty="0" smtClean="0"/>
-              <a:t> </a:t>
+              <a:t>W – </a:t>
             </a:r>
             <a:r>
               <a:rPr lang="pl-PL" dirty="0" err="1" smtClean="0"/>
@@ -7922,6 +8710,30 @@
           </a:prstGeom>
         </p:spPr>
       </p:pic>
+      <p:sp>
+        <p:nvSpPr>
+          <p:cNvPr id="6" name="Symbol zastępczy numeru slajdu 5"/>
+          <p:cNvSpPr>
+            <a:spLocks noGrp="1"/>
+          </p:cNvSpPr>
+          <p:nvPr>
+            <p:ph type="sldNum" sz="quarter" idx="15"/>
+          </p:nvPr>
+        </p:nvSpPr>
+        <p:spPr/>
+        <p:txBody>
+          <a:bodyPr/>
+          <a:lstStyle/>
+          <a:p>
+            <a:fld id="{FB49FE32-2457-4992-8806-C1CA0B468257}" type="slidenum">
+              <a:rPr lang="pl-PL" smtClean="0"/>
+              <a:pPr/>
+              <a:t>3</a:t>
+            </a:fld>
+            <a:endParaRPr lang="pl-PL" dirty="0"/>
+          </a:p>
+        </p:txBody>
+      </p:sp>
     </p:spTree>
   </p:cSld>
   <p:clrMapOvr>
@@ -8024,6 +8836,30 @@
           </a:xfrm>
         </p:spPr>
       </p:pic>
+      <p:sp>
+        <p:nvSpPr>
+          <p:cNvPr id="6" name="Symbol zastępczy numeru slajdu 5"/>
+          <p:cNvSpPr>
+            <a:spLocks noGrp="1"/>
+          </p:cNvSpPr>
+          <p:nvPr>
+            <p:ph type="sldNum" sz="quarter" idx="15"/>
+          </p:nvPr>
+        </p:nvSpPr>
+        <p:spPr/>
+        <p:txBody>
+          <a:bodyPr/>
+          <a:lstStyle/>
+          <a:p>
+            <a:fld id="{FB49FE32-2457-4992-8806-C1CA0B468257}" type="slidenum">
+              <a:rPr lang="pl-PL" smtClean="0"/>
+              <a:pPr/>
+              <a:t>4</a:t>
+            </a:fld>
+            <a:endParaRPr lang="pl-PL" dirty="0"/>
+          </a:p>
+        </p:txBody>
+      </p:sp>
     </p:spTree>
   </p:cSld>
   <p:clrMapOvr>
@@ -8266,6 +9102,30 @@
           </a:prstGeom>
         </p:spPr>
       </p:pic>
+      <p:sp>
+        <p:nvSpPr>
+          <p:cNvPr id="6" name="Symbol zastępczy numeru slajdu 5"/>
+          <p:cNvSpPr>
+            <a:spLocks noGrp="1"/>
+          </p:cNvSpPr>
+          <p:nvPr>
+            <p:ph type="sldNum" sz="quarter" idx="15"/>
+          </p:nvPr>
+        </p:nvSpPr>
+        <p:spPr/>
+        <p:txBody>
+          <a:bodyPr/>
+          <a:lstStyle/>
+          <a:p>
+            <a:fld id="{FB49FE32-2457-4992-8806-C1CA0B468257}" type="slidenum">
+              <a:rPr lang="pl-PL" smtClean="0"/>
+              <a:pPr/>
+              <a:t>5</a:t>
+            </a:fld>
+            <a:endParaRPr lang="pl-PL" dirty="0"/>
+          </a:p>
+        </p:txBody>
+      </p:sp>
     </p:spTree>
   </p:cSld>
   <p:clrMapOvr>
@@ -8376,11 +9236,7 @@
           <a:p>
             <a:r>
               <a:rPr lang="pl-PL" dirty="0" err="1" smtClean="0"/>
-              <a:t>W</a:t>
-            </a:r>
-            <a:r>
-              <a:rPr lang="pl-PL" dirty="0" err="1" smtClean="0"/>
-              <a:t>hile</a:t>
+              <a:t>While</a:t>
             </a:r>
             <a:r>
               <a:rPr lang="pl-PL" dirty="0" smtClean="0"/>
@@ -8640,6 +9496,30 @@
           </a:prstGeom>
         </p:spPr>
       </p:pic>
+      <p:sp>
+        <p:nvSpPr>
+          <p:cNvPr id="6" name="Symbol zastępczy numeru slajdu 5"/>
+          <p:cNvSpPr>
+            <a:spLocks noGrp="1"/>
+          </p:cNvSpPr>
+          <p:nvPr>
+            <p:ph type="sldNum" sz="quarter" idx="15"/>
+          </p:nvPr>
+        </p:nvSpPr>
+        <p:spPr/>
+        <p:txBody>
+          <a:bodyPr/>
+          <a:lstStyle/>
+          <a:p>
+            <a:fld id="{FB49FE32-2457-4992-8806-C1CA0B468257}" type="slidenum">
+              <a:rPr lang="pl-PL" smtClean="0"/>
+              <a:pPr/>
+              <a:t>6</a:t>
+            </a:fld>
+            <a:endParaRPr lang="pl-PL" dirty="0"/>
+          </a:p>
+        </p:txBody>
+      </p:sp>
     </p:spTree>
   </p:cSld>
   <p:clrMapOvr>
@@ -8853,6 +9733,30 @@
           </a:prstGeom>
         </p:spPr>
       </p:pic>
+      <p:sp>
+        <p:nvSpPr>
+          <p:cNvPr id="6" name="Symbol zastępczy numeru slajdu 5"/>
+          <p:cNvSpPr>
+            <a:spLocks noGrp="1"/>
+          </p:cNvSpPr>
+          <p:nvPr>
+            <p:ph type="sldNum" sz="quarter" idx="15"/>
+          </p:nvPr>
+        </p:nvSpPr>
+        <p:spPr/>
+        <p:txBody>
+          <a:bodyPr/>
+          <a:lstStyle/>
+          <a:p>
+            <a:fld id="{FB49FE32-2457-4992-8806-C1CA0B468257}" type="slidenum">
+              <a:rPr lang="pl-PL" smtClean="0"/>
+              <a:pPr/>
+              <a:t>7</a:t>
+            </a:fld>
+            <a:endParaRPr lang="pl-PL" dirty="0"/>
+          </a:p>
+        </p:txBody>
+      </p:sp>
     </p:spTree>
   </p:cSld>
   <p:clrMapOvr>
@@ -9152,6 +10056,30 @@
           </a:prstGeom>
         </p:spPr>
       </p:pic>
+      <p:sp>
+        <p:nvSpPr>
+          <p:cNvPr id="7" name="Symbol zastępczy numeru slajdu 6"/>
+          <p:cNvSpPr>
+            <a:spLocks noGrp="1"/>
+          </p:cNvSpPr>
+          <p:nvPr>
+            <p:ph type="sldNum" sz="quarter" idx="15"/>
+          </p:nvPr>
+        </p:nvSpPr>
+        <p:spPr/>
+        <p:txBody>
+          <a:bodyPr/>
+          <a:lstStyle/>
+          <a:p>
+            <a:fld id="{FB49FE32-2457-4992-8806-C1CA0B468257}" type="slidenum">
+              <a:rPr lang="pl-PL" smtClean="0"/>
+              <a:pPr/>
+              <a:t>8</a:t>
+            </a:fld>
+            <a:endParaRPr lang="pl-PL" dirty="0"/>
+          </a:p>
+        </p:txBody>
+      </p:sp>
     </p:spTree>
   </p:cSld>
   <p:clrMapOvr>
@@ -9361,6 +10289,30 @@
           </a:prstGeom>
         </p:spPr>
       </p:pic>
+      <p:sp>
+        <p:nvSpPr>
+          <p:cNvPr id="6" name="Symbol zastępczy numeru slajdu 5"/>
+          <p:cNvSpPr>
+            <a:spLocks noGrp="1"/>
+          </p:cNvSpPr>
+          <p:nvPr>
+            <p:ph type="sldNum" sz="quarter" idx="15"/>
+          </p:nvPr>
+        </p:nvSpPr>
+        <p:spPr/>
+        <p:txBody>
+          <a:bodyPr/>
+          <a:lstStyle/>
+          <a:p>
+            <a:fld id="{FB49FE32-2457-4992-8806-C1CA0B468257}" type="slidenum">
+              <a:rPr lang="pl-PL" smtClean="0"/>
+              <a:pPr/>
+              <a:t>9</a:t>
+            </a:fld>
+            <a:endParaRPr lang="pl-PL" dirty="0"/>
+          </a:p>
+        </p:txBody>
+      </p:sp>
     </p:spTree>
   </p:cSld>
   <p:clrMapOvr>
@@ -9667,4 +10619,287 @@
   <a:objectDefaults/>
   <a:extraClrSchemeLst/>
 </a:theme>
+</file>
+
+<file path=ppt/theme/theme2.xml><?xml version="1.0" encoding="utf-8"?>
+<a:theme xmlns:a="http://schemas.openxmlformats.org/drawingml/2006/main" name="Motyw pakietu Office">
+  <a:themeElements>
+    <a:clrScheme name="Pakiet Office">
+      <a:dk1>
+        <a:sysClr val="windowText" lastClr="000000"/>
+      </a:dk1>
+      <a:lt1>
+        <a:sysClr val="window" lastClr="FFFFFF"/>
+      </a:lt1>
+      <a:dk2>
+        <a:srgbClr val="1F497D"/>
+      </a:dk2>
+      <a:lt2>
+        <a:srgbClr val="EEECE1"/>
+      </a:lt2>
+      <a:accent1>
+        <a:srgbClr val="4F81BD"/>
+      </a:accent1>
+      <a:accent2>
+        <a:srgbClr val="C0504D"/>
+      </a:accent2>
+      <a:accent3>
+        <a:srgbClr val="9BBB59"/>
+      </a:accent3>
+      <a:accent4>
+        <a:srgbClr val="8064A2"/>
+      </a:accent4>
+      <a:accent5>
+        <a:srgbClr val="4BACC6"/>
+      </a:accent5>
+      <a:accent6>
+        <a:srgbClr val="F79646"/>
+      </a:accent6>
+      <a:hlink>
+        <a:srgbClr val="0000FF"/>
+      </a:hlink>
+      <a:folHlink>
+        <a:srgbClr val="800080"/>
+      </a:folHlink>
+    </a:clrScheme>
+    <a:fontScheme name="Pakiet Office">
+      <a:majorFont>
+        <a:latin typeface="Calibri"/>
+        <a:ea typeface=""/>
+        <a:cs typeface=""/>
+        <a:font script="Jpan" typeface="ＭＳ Ｐゴシック"/>
+        <a:font script="Hang" typeface="맑은 고딕"/>
+        <a:font script="Hans" typeface="宋体"/>
+        <a:font script="Hant" typeface="新細明體"/>
+        <a:font script="Arab" typeface="Times New Roman"/>
+        <a:font script="Hebr" typeface="Times New Roman"/>
+        <a:font script="Thai" typeface="Angsana New"/>
+        <a:font script="Ethi" typeface="Nyala"/>
+        <a:font script="Beng" typeface="Vrinda"/>
+        <a:font script="Gujr" typeface="Shruti"/>
+        <a:font script="Khmr" typeface="MoolBoran"/>
+        <a:font script="Knda" typeface="Tunga"/>
+        <a:font script="Guru" typeface="Raavi"/>
+        <a:font script="Cans" typeface="Euphemia"/>
+        <a:font script="Cher" typeface="Plantagenet Cherokee"/>
+        <a:font script="Yiii" typeface="Microsoft Yi Baiti"/>
+        <a:font script="Tibt" typeface="Microsoft Himalaya"/>
+        <a:font script="Thaa" typeface="MV Boli"/>
+        <a:font script="Deva" typeface="Mangal"/>
+        <a:font script="Telu" typeface="Gautami"/>
+        <a:font script="Taml" typeface="Latha"/>
+        <a:font script="Syrc" typeface="Estrangelo Edessa"/>
+        <a:font script="Orya" typeface="Kalinga"/>
+        <a:font script="Mlym" typeface="Kartika"/>
+        <a:font script="Laoo" typeface="DokChampa"/>
+        <a:font script="Sinh" typeface="Iskoola Pota"/>
+        <a:font script="Mong" typeface="Mongolian Baiti"/>
+        <a:font script="Viet" typeface="Times New Roman"/>
+        <a:font script="Uigh" typeface="Microsoft Uighur"/>
+      </a:majorFont>
+      <a:minorFont>
+        <a:latin typeface="Calibri"/>
+        <a:ea typeface=""/>
+        <a:cs typeface=""/>
+        <a:font script="Jpan" typeface="ＭＳ Ｐゴシック"/>
+        <a:font script="Hang" typeface="맑은 고딕"/>
+        <a:font script="Hans" typeface="宋体"/>
+        <a:font script="Hant" typeface="新細明體"/>
+        <a:font script="Arab" typeface="Arial"/>
+        <a:font script="Hebr" typeface="Arial"/>
+        <a:font script="Thai" typeface="Cordia New"/>
+        <a:font script="Ethi" typeface="Nyala"/>
+        <a:font script="Beng" typeface="Vrinda"/>
+        <a:font script="Gujr" typeface="Shruti"/>
+        <a:font script="Khmr" typeface="DaunPenh"/>
+        <a:font script="Knda" typeface="Tunga"/>
+        <a:font script="Guru" typeface="Raavi"/>
+        <a:font script="Cans" typeface="Euphemia"/>
+        <a:font script="Cher" typeface="Plantagenet Cherokee"/>
+        <a:font script="Yiii" typeface="Microsoft Yi Baiti"/>
+        <a:font script="Tibt" typeface="Microsoft Himalaya"/>
+        <a:font script="Thaa" typeface="MV Boli"/>
+        <a:font script="Deva" typeface="Mangal"/>
+        <a:font script="Telu" typeface="Gautami"/>
+        <a:font script="Taml" typeface="Latha"/>
+        <a:font script="Syrc" typeface="Estrangelo Edessa"/>
+        <a:font script="Orya" typeface="Kalinga"/>
+        <a:font script="Mlym" typeface="Kartika"/>
+        <a:font script="Laoo" typeface="DokChampa"/>
+        <a:font script="Sinh" typeface="Iskoola Pota"/>
+        <a:font script="Mong" typeface="Mongolian Baiti"/>
+        <a:font script="Viet" typeface="Arial"/>
+        <a:font script="Uigh" typeface="Microsoft Uighur"/>
+      </a:minorFont>
+    </a:fontScheme>
+    <a:fmtScheme name="Pakiet Office">
+      <a:fillStyleLst>
+        <a:solidFill>
+          <a:schemeClr val="phClr"/>
+        </a:solidFill>
+        <a:gradFill rotWithShape="1">
+          <a:gsLst>
+            <a:gs pos="0">
+              <a:schemeClr val="phClr">
+                <a:tint val="50000"/>
+                <a:satMod val="300000"/>
+              </a:schemeClr>
+            </a:gs>
+            <a:gs pos="35000">
+              <a:schemeClr val="phClr">
+                <a:tint val="37000"/>
+                <a:satMod val="300000"/>
+              </a:schemeClr>
+            </a:gs>
+            <a:gs pos="100000">
+              <a:schemeClr val="phClr">
+                <a:tint val="15000"/>
+                <a:satMod val="350000"/>
+              </a:schemeClr>
+            </a:gs>
+          </a:gsLst>
+          <a:lin ang="16200000" scaled="1"/>
+        </a:gradFill>
+        <a:gradFill rotWithShape="1">
+          <a:gsLst>
+            <a:gs pos="0">
+              <a:schemeClr val="phClr">
+                <a:shade val="51000"/>
+                <a:satMod val="130000"/>
+              </a:schemeClr>
+            </a:gs>
+            <a:gs pos="80000">
+              <a:schemeClr val="phClr">
+                <a:shade val="93000"/>
+                <a:satMod val="130000"/>
+              </a:schemeClr>
+            </a:gs>
+            <a:gs pos="100000">
+              <a:schemeClr val="phClr">
+                <a:shade val="94000"/>
+                <a:satMod val="135000"/>
+              </a:schemeClr>
+            </a:gs>
+          </a:gsLst>
+          <a:lin ang="16200000" scaled="0"/>
+        </a:gradFill>
+      </a:fillStyleLst>
+      <a:lnStyleLst>
+        <a:ln w="9525" cap="flat" cmpd="sng" algn="ctr">
+          <a:solidFill>
+            <a:schemeClr val="phClr">
+              <a:shade val="95000"/>
+              <a:satMod val="105000"/>
+            </a:schemeClr>
+          </a:solidFill>
+          <a:prstDash val="solid"/>
+        </a:ln>
+        <a:ln w="25400" cap="flat" cmpd="sng" algn="ctr">
+          <a:solidFill>
+            <a:schemeClr val="phClr"/>
+          </a:solidFill>
+          <a:prstDash val="solid"/>
+        </a:ln>
+        <a:ln w="38100" cap="flat" cmpd="sng" algn="ctr">
+          <a:solidFill>
+            <a:schemeClr val="phClr"/>
+          </a:solidFill>
+          <a:prstDash val="solid"/>
+        </a:ln>
+      </a:lnStyleLst>
+      <a:effectStyleLst>
+        <a:effectStyle>
+          <a:effectLst>
+            <a:outerShdw blurRad="40000" dist="20000" dir="5400000" rotWithShape="0">
+              <a:srgbClr val="000000">
+                <a:alpha val="38000"/>
+              </a:srgbClr>
+            </a:outerShdw>
+          </a:effectLst>
+        </a:effectStyle>
+        <a:effectStyle>
+          <a:effectLst>
+            <a:outerShdw blurRad="40000" dist="23000" dir="5400000" rotWithShape="0">
+              <a:srgbClr val="000000">
+                <a:alpha val="35000"/>
+              </a:srgbClr>
+            </a:outerShdw>
+          </a:effectLst>
+        </a:effectStyle>
+        <a:effectStyle>
+          <a:effectLst>
+            <a:outerShdw blurRad="40000" dist="23000" dir="5400000" rotWithShape="0">
+              <a:srgbClr val="000000">
+                <a:alpha val="35000"/>
+              </a:srgbClr>
+            </a:outerShdw>
+          </a:effectLst>
+          <a:scene3d>
+            <a:camera prst="orthographicFront">
+              <a:rot lat="0" lon="0" rev="0"/>
+            </a:camera>
+            <a:lightRig rig="threePt" dir="t">
+              <a:rot lat="0" lon="0" rev="1200000"/>
+            </a:lightRig>
+          </a:scene3d>
+          <a:sp3d>
+            <a:bevelT w="63500" h="25400"/>
+          </a:sp3d>
+        </a:effectStyle>
+      </a:effectStyleLst>
+      <a:bgFillStyleLst>
+        <a:solidFill>
+          <a:schemeClr val="phClr"/>
+        </a:solidFill>
+        <a:gradFill rotWithShape="1">
+          <a:gsLst>
+            <a:gs pos="0">
+              <a:schemeClr val="phClr">
+                <a:tint val="40000"/>
+                <a:satMod val="350000"/>
+              </a:schemeClr>
+            </a:gs>
+            <a:gs pos="40000">
+              <a:schemeClr val="phClr">
+                <a:tint val="45000"/>
+                <a:shade val="99000"/>
+                <a:satMod val="350000"/>
+              </a:schemeClr>
+            </a:gs>
+            <a:gs pos="100000">
+              <a:schemeClr val="phClr">
+                <a:shade val="20000"/>
+                <a:satMod val="255000"/>
+              </a:schemeClr>
+            </a:gs>
+          </a:gsLst>
+          <a:path path="circle">
+            <a:fillToRect l="50000" t="-80000" r="50000" b="180000"/>
+          </a:path>
+        </a:gradFill>
+        <a:gradFill rotWithShape="1">
+          <a:gsLst>
+            <a:gs pos="0">
+              <a:schemeClr val="phClr">
+                <a:tint val="80000"/>
+                <a:satMod val="300000"/>
+              </a:schemeClr>
+            </a:gs>
+            <a:gs pos="100000">
+              <a:schemeClr val="phClr">
+                <a:shade val="30000"/>
+                <a:satMod val="200000"/>
+              </a:schemeClr>
+            </a:gs>
+          </a:gsLst>
+          <a:path path="circle">
+            <a:fillToRect l="50000" t="50000" r="50000" b="50000"/>
+          </a:path>
+        </a:gradFill>
+      </a:bgFillStyleLst>
+    </a:fmtScheme>
+  </a:themeElements>
+  <a:objectDefaults/>
+  <a:extraClrSchemeLst/>
+</a:theme>
 </file>
</xml_diff>